<commit_message>
Update data wrangling and data storytelling based on feedback
</commit_message>
<xml_diff>
--- a/11 Writeup/Working Docs/Capstone1_datastorytelling.pptx
+++ b/11 Writeup/Working Docs/Capstone1_datastorytelling.pptx
@@ -313,7 +313,7 @@
             <a:fld id="{451DEABC-D766-4322-8E78-B830FAE35C72}" type="datetime4">
               <a:rPr lang="en-US" smtClean="0"/>
               <a:pPr/>
-              <a:t>December 18, 2017</a:t>
+              <a:t>December 20, 2017</a:t>
             </a:fld>
             <a:endParaRPr lang="en-US" dirty="0"/>
           </a:p>
@@ -488,7 +488,7 @@
             <a:fld id="{F3131F9E-604E-4343-9F29-EF72E8231CAD}" type="datetime4">
               <a:rPr lang="en-US" smtClean="0"/>
               <a:pPr/>
-              <a:t>December 18, 2017</a:t>
+              <a:t>December 20, 2017</a:t>
             </a:fld>
             <a:endParaRPr lang="en-US"/>
           </a:p>
@@ -665,7 +665,7 @@
             <a:fld id="{34A8E1CE-37F8-4102-8DF9-852A0A51F293}" type="datetime4">
               <a:rPr lang="en-US" smtClean="0"/>
               <a:pPr/>
-              <a:t>December 18, 2017</a:t>
+              <a:t>December 20, 2017</a:t>
             </a:fld>
             <a:endParaRPr lang="en-US"/>
           </a:p>
@@ -842,7 +842,7 @@
             <a:fld id="{93333F43-3E86-47E4-BFBB-2476D384E1C6}" type="datetime4">
               <a:rPr lang="en-US" smtClean="0"/>
               <a:pPr/>
-              <a:t>December 18, 2017</a:t>
+              <a:t>December 20, 2017</a:t>
             </a:fld>
             <a:endParaRPr lang="en-US"/>
           </a:p>
@@ -1140,7 +1140,7 @@
             <a:fld id="{751663BA-01FC-4367-B6F3-ABB2645D55F1}" type="datetime4">
               <a:rPr lang="en-US" smtClean="0"/>
               <a:pPr/>
-              <a:t>December 18, 2017</a:t>
+              <a:t>December 20, 2017</a:t>
             </a:fld>
             <a:endParaRPr lang="en-US" dirty="0"/>
           </a:p>
@@ -1425,7 +1425,7 @@
             <a:fld id="{79B19C71-EC74-44AF-B27E-FC7DC3C3A61D}" type="datetime4">
               <a:rPr lang="en-US" smtClean="0"/>
               <a:pPr/>
-              <a:t>December 18, 2017</a:t>
+              <a:t>December 20, 2017</a:t>
             </a:fld>
             <a:endParaRPr lang="en-US"/>
           </a:p>
@@ -1866,7 +1866,7 @@
             <a:fld id="{6A5CDA29-3CBE-48EA-92AE-A996835462BA}" type="datetime4">
               <a:rPr lang="en-US" smtClean="0"/>
               <a:pPr/>
-              <a:t>December 18, 2017</a:t>
+              <a:t>December 20, 2017</a:t>
             </a:fld>
             <a:endParaRPr lang="en-US"/>
           </a:p>
@@ -1981,7 +1981,7 @@
             <a:fld id="{E29EC054-3869-4501-B163-1BBFDE8DCE04}" type="datetime4">
               <a:rPr lang="en-US" smtClean="0"/>
               <a:pPr/>
-              <a:t>December 18, 2017</a:t>
+              <a:t>December 20, 2017</a:t>
             </a:fld>
             <a:endParaRPr lang="en-US"/>
           </a:p>
@@ -2073,7 +2073,7 @@
             <a:fld id="{0A63D831-56C1-49CF-8EF7-8B9A98402BCD}" type="datetime4">
               <a:rPr lang="en-US" smtClean="0"/>
               <a:pPr/>
-              <a:t>December 18, 2017</a:t>
+              <a:t>December 20, 2017</a:t>
             </a:fld>
             <a:endParaRPr lang="en-US"/>
           </a:p>
@@ -2317,7 +2317,7 @@
             <a:fld id="{6EAD5615-7F4F-4584-84D5-CC95918C321F}" type="datetime4">
               <a:rPr lang="en-US" smtClean="0"/>
               <a:pPr/>
-              <a:t>December 18, 2017</a:t>
+              <a:t>December 20, 2017</a:t>
             </a:fld>
             <a:endParaRPr lang="en-US"/>
           </a:p>
@@ -2567,7 +2567,7 @@
             <a:fld id="{76EEA923-9BEE-48CE-9F28-5B525F399BAD}" type="datetime4">
               <a:rPr lang="en-US" smtClean="0"/>
               <a:pPr/>
-              <a:t>December 18, 2017</a:t>
+              <a:t>December 20, 2017</a:t>
             </a:fld>
             <a:endParaRPr lang="en-US"/>
           </a:p>
@@ -2817,7 +2817,7 @@
             <a:fld id="{17D0EFEE-2756-4A20-BF2A-63F0A94F99AC}" type="datetime4">
               <a:rPr lang="en-US" smtClean="0"/>
               <a:pPr/>
-              <a:t>December 18, 2017</a:t>
+              <a:t>December 20, 2017</a:t>
             </a:fld>
             <a:endParaRPr lang="en-US" dirty="0"/>
           </a:p>
@@ -3312,25 +3312,12 @@
           <a:p>
             <a:r>
               <a:rPr lang="en-US" dirty="0" smtClean="0"/>
-              <a:t>Analysis of the </a:t>
-            </a:r>
-            <a:r>
-              <a:rPr lang="en-US" dirty="0" smtClean="0"/>
-              <a:t>text </a:t>
-            </a:r>
-            <a:r>
-              <a:rPr lang="en-US" dirty="0" smtClean="0"/>
-              <a:t>give might provide </a:t>
-            </a:r>
-            <a:r>
-              <a:rPr lang="en-US" dirty="0" smtClean="0"/>
-              <a:t>a </a:t>
+              <a:t>Analysis of the text give might provide a </a:t>
             </a:r>
             <a:r>
               <a:rPr lang="en-US" dirty="0"/>
               <a:t>fair ‘representative’ star rating </a:t>
             </a:r>
-            <a:endParaRPr lang="en-US" dirty="0"/>
           </a:p>
         </p:txBody>
       </p:sp>
@@ -3456,7 +3443,7 @@
         <p:spPr>
           <a:xfrm>
             <a:off x="457200" y="2389590"/>
-            <a:ext cx="1102598" cy="307777"/>
+            <a:ext cx="922886" cy="307777"/>
           </a:xfrm>
           <a:prstGeom prst="rect">
             <a:avLst/>
@@ -3470,8 +3457,16 @@
           <a:lstStyle/>
           <a:p>
             <a:r>
+              <a:rPr lang="en-US" sz="1400" dirty="0" err="1" smtClean="0"/>
+              <a:t>Uni</a:t>
+            </a:r>
+            <a:r>
               <a:rPr lang="en-US" sz="1400" dirty="0" smtClean="0"/>
-              <a:t>Mono-gram</a:t>
+              <a:t>-</a:t>
+            </a:r>
+            <a:r>
+              <a:rPr lang="en-US" sz="1400" dirty="0" smtClean="0"/>
+              <a:t>gram</a:t>
             </a:r>
             <a:endParaRPr lang="en-US" sz="1400" dirty="0"/>
           </a:p>
@@ -3865,17 +3860,8 @@
           <a:p>
             <a:r>
               <a:rPr lang="en-US" sz="1400" b="1" dirty="0" smtClean="0"/>
-              <a:t>Rank of word in terms of frequency of use </a:t>
-            </a:r>
-            <a:r>
-              <a:rPr lang="en-US" sz="1400" b="1" dirty="0" smtClean="0"/>
-              <a:t>(in text by star rating)</a:t>
-            </a:r>
-            <a:r>
-              <a:rPr lang="en-US" sz="1400" b="1" dirty="0" smtClean="0"/>
-              <a:t>:</a:t>
-            </a:r>
-            <a:endParaRPr lang="en-US" sz="1400" b="1" dirty="0" smtClean="0"/>
+              <a:t>Rank of word in terms of frequency of use (in text by star rating):</a:t>
+            </a:r>
           </a:p>
           <a:p>
             <a:endParaRPr lang="en-US" sz="1400" b="1" dirty="0" smtClean="0"/>
@@ -3885,7 +3871,6 @@
               <a:rPr lang="en-US" sz="1400" dirty="0" smtClean="0"/>
               <a:t>1</a:t>
             </a:r>
-            <a:endParaRPr lang="en-US" sz="1400" dirty="0" smtClean="0"/>
           </a:p>
           <a:p>
             <a:r>
@@ -3913,14 +3898,12 @@
               <a:rPr lang="en-US" sz="1400" dirty="0" smtClean="0"/>
               <a:t>5</a:t>
             </a:r>
-            <a:endParaRPr lang="en-US" sz="1400" dirty="0" smtClean="0"/>
           </a:p>
           <a:p>
             <a:r>
               <a:rPr lang="en-US" sz="1400" dirty="0" smtClean="0"/>
               <a:t>.</a:t>
             </a:r>
-            <a:endParaRPr lang="en-US" sz="1400" dirty="0" smtClean="0"/>
           </a:p>
           <a:p>
             <a:r>
@@ -3934,7 +3917,6 @@
               <a:rPr lang="en-US" sz="1400" dirty="0" smtClean="0"/>
               <a:t>.</a:t>
             </a:r>
-            <a:endParaRPr lang="en-US" sz="1400" dirty="0" smtClean="0"/>
           </a:p>
           <a:p>
             <a:endParaRPr lang="en-US" sz="1400" dirty="0" smtClean="0"/>
@@ -5208,11 +5190,7 @@
           <a:p>
             <a:r>
               <a:rPr lang="en-US" sz="1400" dirty="0" smtClean="0"/>
-              <a:t>t</a:t>
-            </a:r>
-            <a:r>
-              <a:rPr lang="en-US" sz="1400" dirty="0" smtClean="0"/>
-              <a:t>ime</a:t>
+              <a:t>time</a:t>
             </a:r>
           </a:p>
           <a:p>
@@ -5582,19 +5560,7 @@
           <a:p>
             <a:r>
               <a:rPr lang="en-US" dirty="0" smtClean="0"/>
-              <a:t>Basic analysis of top </a:t>
-            </a:r>
-            <a:r>
-              <a:rPr lang="en-US" dirty="0" smtClean="0"/>
-              <a:t>words </a:t>
-            </a:r>
-            <a:r>
-              <a:rPr lang="en-US" dirty="0" smtClean="0"/>
-              <a:t>used, suggest differences </a:t>
-            </a:r>
-            <a:r>
-              <a:rPr lang="en-US" dirty="0" smtClean="0"/>
-              <a:t>based on star ratings</a:t>
+              <a:t>Basic analysis of top words used, suggest differences based on star ratings</a:t>
             </a:r>
             <a:endParaRPr lang="en-US" dirty="0"/>
           </a:p>
@@ -5857,19 +5823,7 @@
           <a:p>
             <a:r>
               <a:rPr lang="en-US" dirty="0" smtClean="0"/>
-              <a:t>Basic analysis of top </a:t>
-            </a:r>
-            <a:r>
-              <a:rPr lang="en-US" dirty="0" smtClean="0"/>
-              <a:t>words </a:t>
-            </a:r>
-            <a:r>
-              <a:rPr lang="en-US" dirty="0" smtClean="0"/>
-              <a:t>used, suggest differences </a:t>
-            </a:r>
-            <a:r>
-              <a:rPr lang="en-US" dirty="0" smtClean="0"/>
-              <a:t>based on star ratings</a:t>
+              <a:t>Basic analysis of top words used, suggest differences based on star ratings</a:t>
             </a:r>
             <a:endParaRPr lang="en-US" dirty="0"/>
           </a:p>
@@ -6093,17 +6047,8 @@
           <a:p>
             <a:r>
               <a:rPr lang="en-US" sz="1400" b="1" dirty="0" smtClean="0"/>
-              <a:t>Rank of word in terms of frequency of use </a:t>
-            </a:r>
-            <a:r>
-              <a:rPr lang="en-US" sz="1400" b="1" dirty="0" smtClean="0"/>
-              <a:t>(in text by star rating)</a:t>
-            </a:r>
-            <a:r>
-              <a:rPr lang="en-US" sz="1400" b="1" dirty="0" smtClean="0"/>
-              <a:t>:</a:t>
-            </a:r>
-            <a:endParaRPr lang="en-US" sz="1400" b="1" dirty="0" smtClean="0"/>
+              <a:t>Rank of word in terms of frequency of use (in text by star rating):</a:t>
+            </a:r>
           </a:p>
           <a:p>
             <a:endParaRPr lang="en-US" sz="1400" b="1" dirty="0" smtClean="0"/>
@@ -9220,15 +9165,7 @@
           <a:p>
             <a:r>
               <a:rPr lang="en-US" dirty="0" smtClean="0"/>
-              <a:t>Restaurants with better </a:t>
-            </a:r>
-            <a:r>
-              <a:rPr lang="en-US" dirty="0" smtClean="0"/>
-              <a:t>ratings </a:t>
-            </a:r>
-            <a:r>
-              <a:rPr lang="en-US" dirty="0" smtClean="0"/>
-              <a:t>tend to get more reviews</a:t>
+              <a:t>Restaurants with better ratings tend to get more reviews</a:t>
             </a:r>
             <a:endParaRPr lang="en-US" dirty="0"/>
           </a:p>
@@ -9251,11 +9188,7 @@
           <a:p>
             <a:r>
               <a:rPr lang="en-US" dirty="0" smtClean="0"/>
-              <a:t>Distribution of </a:t>
-            </a:r>
-            <a:r>
-              <a:rPr lang="en-US" dirty="0" smtClean="0"/>
-              <a:t>Reviews </a:t>
+              <a:t>Distribution of Reviews </a:t>
             </a:r>
             <a:r>
               <a:rPr lang="en-US" dirty="0"/>
@@ -9263,11 +9196,7 @@
             </a:r>
             <a:r>
               <a:rPr lang="en-US" dirty="0" smtClean="0"/>
-              <a:t>restaurant’s average star </a:t>
-            </a:r>
-            <a:r>
-              <a:rPr lang="en-US" dirty="0" smtClean="0"/>
-              <a:t>rating</a:t>
+              <a:t>restaurant’s average star rating</a:t>
             </a:r>
             <a:endParaRPr lang="en-US" dirty="0"/>
           </a:p>
@@ -9510,7 +9439,6 @@
               <a:rPr lang="en-US" sz="1400" dirty="0" smtClean="0"/>
               <a:t>3.7</a:t>
             </a:r>
-            <a:endParaRPr lang="en-US" sz="1400" dirty="0" smtClean="0"/>
           </a:p>
           <a:p>
             <a:pPr marL="285750" indent="-285750">

</xml_diff>